<commit_message>
Exercício de tratamento de texto
</commit_message>
<xml_diff>
--- a/Apresentações/06 - Tratamento de texto.pptx
+++ b/Apresentações/06 - Tratamento de texto.pptx
@@ -31277,14 +31277,14 @@
           <p:nvPr>
             <p:extLst>
               <p:ext uri="{D42A27DB-BD31-4B8C-83A1-F6EECF244321}">
-                <p14:modId xmlns:p14="http://schemas.microsoft.com/office/powerpoint/2010/main" val="2156637724"/>
+                <p14:modId xmlns:p14="http://schemas.microsoft.com/office/powerpoint/2010/main" val="146791519"/>
               </p:ext>
             </p:extLst>
           </p:nvPr>
         </p:nvGraphicFramePr>
         <p:xfrm>
           <a:off x="182952" y="1377876"/>
-          <a:ext cx="8778096" cy="3256605"/>
+          <a:ext cx="8778096" cy="3413809"/>
         </p:xfrm>
         <a:graphic>
           <a:graphicData uri="http://schemas.openxmlformats.org/drawingml/2006/table">
@@ -31503,7 +31503,7 @@
                   </a:ext>
                 </a:extLst>
               </a:tr>
-              <a:tr h="285561">
+              <a:tr h="442765">
                 <a:tc>
                   <a:txBody>
                     <a:bodyPr/>
@@ -31741,7 +31741,7 @@
                   </a:ext>
                 </a:extLst>
               </a:tr>
-              <a:tr h="285561">
+              <a:tr h="331795">
                 <a:tc>
                   <a:txBody>
                     <a:bodyPr/>
@@ -31848,7 +31848,7 @@
                         <a:defRPr/>
                       </a:pPr>
                       <a:r>
-                        <a:rPr kumimoji="0" lang="pt-BR" altLang="pt-BR" sz="1200" b="0" i="0" u="none" strike="noStrike" cap="none" normalizeH="0" baseline="0">
+                        <a:rPr kumimoji="0" lang="pt-BR" altLang="pt-BR" sz="1200" b="0" i="0" u="none" strike="noStrike" cap="none" normalizeH="0" baseline="0" dirty="0">
                           <a:ln>
                             <a:noFill/>
                           </a:ln>
@@ -32158,7 +32158,7 @@
                         <a:defRPr/>
                       </a:pPr>
                       <a:r>
-                        <a:rPr kumimoji="0" lang="pt-BR" altLang="pt-BR" sz="1200" b="0" i="0" u="none" strike="noStrike" cap="none" normalizeH="0" baseline="0">
+                        <a:rPr kumimoji="0" lang="pt-BR" altLang="pt-BR" sz="1200" b="0" i="0" u="none" strike="noStrike" cap="none" normalizeH="0" baseline="0" dirty="0">
                           <a:ln>
                             <a:noFill/>
                           </a:ln>
@@ -32191,7 +32191,7 @@
                         <a:defRPr/>
                       </a:pPr>
                       <a:r>
-                        <a:rPr kumimoji="0" lang="pt-BR" altLang="pt-BR" sz="1200" b="0" i="0" u="none" strike="noStrike" cap="none" normalizeH="0" baseline="0">
+                        <a:rPr kumimoji="0" lang="pt-BR" altLang="pt-BR" sz="1200" b="0" i="0" u="none" strike="noStrike" cap="none" normalizeH="0" baseline="0" dirty="0">
                           <a:ln>
                             <a:noFill/>
                           </a:ln>
@@ -32205,7 +32205,7 @@
                         <a:t>pos1</a:t>
                       </a:r>
                       <a:r>
-                        <a:rPr kumimoji="0" lang="pt-BR" altLang="pt-BR" sz="1200" b="0" i="0" u="none" strike="noStrike" cap="none" normalizeH="0" baseline="0">
+                        <a:rPr kumimoji="0" lang="pt-BR" altLang="pt-BR" sz="1200" b="0" i="0" u="none" strike="noStrike" cap="none" normalizeH="0" baseline="0" dirty="0">
                           <a:ln>
                             <a:noFill/>
                           </a:ln>
@@ -32219,7 +32219,7 @@
                         <a:t> até </a:t>
                       </a:r>
                       <a:r>
-                        <a:rPr kumimoji="0" lang="pt-BR" altLang="pt-BR" sz="1200" b="0" i="0" u="none" strike="noStrike" cap="none" normalizeH="0" baseline="0">
+                        <a:rPr kumimoji="0" lang="pt-BR" altLang="pt-BR" sz="1200" b="0" i="0" u="none" strike="noStrike" cap="none" normalizeH="0" baseline="0" dirty="0">
                           <a:ln>
                             <a:noFill/>
                           </a:ln>
@@ -32233,7 +32233,7 @@
                         <a:t>pos2-1</a:t>
                       </a:r>
                       <a:r>
-                        <a:rPr kumimoji="0" lang="pt-BR" altLang="pt-BR" sz="1200" b="0" i="0" u="none" strike="noStrike" cap="none" normalizeH="0" baseline="0">
+                        <a:rPr kumimoji="0" lang="pt-BR" altLang="pt-BR" sz="1200" b="0" i="0" u="none" strike="noStrike" cap="none" normalizeH="0" baseline="0" dirty="0">
                           <a:ln>
                             <a:noFill/>
                           </a:ln>
@@ -32247,7 +32247,7 @@
                         <a:t> [</a:t>
                       </a:r>
                       <a:r>
-                        <a:rPr kumimoji="0" lang="pt-BR" altLang="pt-BR" sz="1200" b="0" i="0" u="none" strike="noStrike" cap="none" normalizeH="0" baseline="0" err="1">
+                        <a:rPr kumimoji="0" lang="pt-BR" altLang="pt-BR" sz="1200" b="0" i="0" u="none" strike="noStrike" cap="none" normalizeH="0" baseline="0" dirty="0" err="1">
                           <a:ln>
                             <a:noFill/>
                           </a:ln>
@@ -32261,7 +32261,7 @@
                         <a:t>inicio:final</a:t>
                       </a:r>
                       <a:r>
-                        <a:rPr kumimoji="0" lang="pt-BR" altLang="pt-BR" sz="1200" b="0" i="0" u="none" strike="noStrike" cap="none" normalizeH="0" baseline="0">
+                        <a:rPr kumimoji="0" lang="pt-BR" altLang="pt-BR" sz="1200" b="0" i="0" u="none" strike="noStrike" cap="none" normalizeH="0" baseline="0" dirty="0">
                           <a:ln>
                             <a:noFill/>
                           </a:ln>
@@ -32504,7 +32504,7 @@
                         <a:defRPr/>
                       </a:pPr>
                       <a:r>
-                        <a:rPr kumimoji="0" lang="pt-BR" altLang="pt-BR" sz="1200" b="0" i="0" u="none" strike="noStrike" cap="none" normalizeH="0" baseline="0">
+                        <a:rPr kumimoji="0" lang="pt-BR" altLang="pt-BR" sz="1200" b="0" i="0" u="none" strike="noStrike" cap="none" normalizeH="0" baseline="0" dirty="0">
                           <a:ln>
                             <a:noFill/>
                           </a:ln>
@@ -32518,7 +32518,7 @@
                         <a:t>O conteúdo a partir da </a:t>
                       </a:r>
                       <a:r>
-                        <a:rPr kumimoji="0" lang="pt-BR" altLang="pt-BR" sz="1200" b="0" i="0" u="none" strike="noStrike" cap="none" normalizeH="0" baseline="0">
+                        <a:rPr kumimoji="0" lang="pt-BR" altLang="pt-BR" sz="1200" b="0" i="0" u="none" strike="noStrike" cap="none" normalizeH="0" baseline="0" dirty="0">
                           <a:ln>
                             <a:noFill/>
                           </a:ln>
@@ -32532,7 +32532,7 @@
                         <a:t>pos1</a:t>
                       </a:r>
                       <a:r>
-                        <a:rPr kumimoji="0" lang="pt-BR" altLang="pt-BR" sz="1200" b="0" i="0" u="none" strike="noStrike" cap="none" normalizeH="0" baseline="0">
+                        <a:rPr kumimoji="0" lang="pt-BR" altLang="pt-BR" sz="1200" b="0" i="0" u="none" strike="noStrike" cap="none" normalizeH="0" baseline="0" dirty="0">
                           <a:ln>
                             <a:noFill/>
                           </a:ln>
@@ -33094,7 +33094,7 @@
                         <a:defRPr/>
                       </a:pPr>
                       <a:r>
-                        <a:rPr kumimoji="0" lang="pt-BR" altLang="pt-BR" sz="1200" b="0" i="0" u="none" strike="noStrike" cap="none" normalizeH="0" baseline="0">
+                        <a:rPr kumimoji="0" lang="pt-BR" altLang="pt-BR" sz="1200" b="0" i="0" u="none" strike="noStrike" cap="none" normalizeH="0" baseline="0" dirty="0">
                           <a:ln>
                             <a:noFill/>
                           </a:ln>
@@ -33108,7 +33108,7 @@
                         <a:t>O conteúdo dos </a:t>
                       </a:r>
                       <a:r>
-                        <a:rPr kumimoji="0" lang="pt-BR" altLang="pt-BR" sz="1200" b="1" i="0" u="none" strike="noStrike" cap="none" normalizeH="0" baseline="0">
+                        <a:rPr kumimoji="0" lang="pt-BR" altLang="pt-BR" sz="1200" b="1" i="0" u="none" strike="noStrike" cap="none" normalizeH="0" baseline="0" dirty="0">
                           <a:ln>
                             <a:noFill/>
                           </a:ln>
@@ -33122,7 +33122,7 @@
                         <a:t>n </a:t>
                       </a:r>
                       <a:r>
-                        <a:rPr kumimoji="0" lang="pt-BR" altLang="pt-BR" sz="1200" b="0" i="0" u="none" strike="noStrike" cap="none" normalizeH="0" baseline="0">
+                        <a:rPr kumimoji="0" lang="pt-BR" altLang="pt-BR" sz="1200" b="0" i="0" u="none" strike="noStrike" cap="none" normalizeH="0" baseline="0" dirty="0">
                           <a:ln>
                             <a:noFill/>
                           </a:ln>
@@ -33309,7 +33309,7 @@
                         <a:defRPr/>
                       </a:pPr>
                       <a:r>
-                        <a:rPr kumimoji="0" lang="pt-BR" altLang="pt-BR" sz="1200" b="0" i="0" u="none" strike="noStrike" cap="none" normalizeH="0" baseline="0">
+                        <a:rPr kumimoji="0" lang="pt-BR" altLang="pt-BR" sz="1200" b="0" i="0" u="none" strike="noStrike" cap="none" normalizeH="0" baseline="0" dirty="0">
                           <a:ln>
                             <a:noFill/>
                           </a:ln>
@@ -33323,7 +33323,7 @@
                         <a:t>O conteúdo sem  os </a:t>
                       </a:r>
                       <a:r>
-                        <a:rPr kumimoji="0" lang="pt-BR" altLang="pt-BR" sz="1200" b="1" i="0" u="none" strike="noStrike" cap="none" normalizeH="0" baseline="0">
+                        <a:rPr kumimoji="0" lang="pt-BR" altLang="pt-BR" sz="1200" b="1" i="0" u="none" strike="noStrike" cap="none" normalizeH="0" baseline="0" dirty="0">
                           <a:ln>
                             <a:noFill/>
                           </a:ln>
@@ -33337,7 +33337,7 @@
                         <a:t>n </a:t>
                       </a:r>
                       <a:r>
-                        <a:rPr kumimoji="0" lang="pt-BR" altLang="pt-BR" sz="1200" b="0" i="0" u="none" strike="noStrike" cap="none" normalizeH="0" baseline="0">
+                        <a:rPr kumimoji="0" lang="pt-BR" altLang="pt-BR" sz="1200" b="0" i="0" u="none" strike="noStrike" cap="none" normalizeH="0" baseline="0" dirty="0">
                           <a:ln>
                             <a:noFill/>
                           </a:ln>
@@ -33524,7 +33524,7 @@
                         <a:defRPr/>
                       </a:pPr>
                       <a:r>
-                        <a:rPr kumimoji="0" lang="pt-BR" altLang="pt-BR" sz="1200" b="0" i="0" u="none" strike="noStrike" cap="none" normalizeH="0" baseline="0">
+                        <a:rPr kumimoji="0" lang="pt-BR" altLang="pt-BR" sz="1200" b="0" i="0" u="none" strike="noStrike" cap="none" normalizeH="0" baseline="0" dirty="0">
                           <a:ln>
                             <a:noFill/>
                           </a:ln>
@@ -36313,7 +36313,7 @@
           <p:nvPr>
             <p:extLst>
               <p:ext uri="{D42A27DB-BD31-4B8C-83A1-F6EECF244321}">
-                <p14:modId xmlns:p14="http://schemas.microsoft.com/office/powerpoint/2010/main" val="1657653206"/>
+                <p14:modId xmlns:p14="http://schemas.microsoft.com/office/powerpoint/2010/main" val="2864157231"/>
               </p:ext>
             </p:extLst>
           </p:nvPr>
@@ -36606,7 +36606,7 @@
                         <a:defRPr/>
                       </a:pPr>
                       <a:r>
-                        <a:rPr kumimoji="0" lang="pt-BR" altLang="pt-BR" sz="1200" b="0" i="0" u="none" strike="noStrike" cap="none" normalizeH="0" baseline="0">
+                        <a:rPr kumimoji="0" lang="pt-BR" altLang="pt-BR" sz="1200" b="0" i="0" u="none" strike="noStrike" cap="none" normalizeH="0" baseline="0" dirty="0">
                           <a:ln>
                             <a:noFill/>
                           </a:ln>
@@ -36619,7 +36619,7 @@
                         <a:t>Retorna um </a:t>
                       </a:r>
                       <a:r>
-                        <a:rPr kumimoji="0" lang="pt-BR" altLang="pt-BR" sz="1200" b="0" i="0" u="none" strike="noStrike" cap="none" normalizeH="0" baseline="0" err="1">
+                        <a:rPr kumimoji="0" lang="pt-BR" altLang="pt-BR" sz="1200" b="0" i="0" u="none" strike="noStrike" cap="none" normalizeH="0" baseline="0" dirty="0" err="1">
                           <a:ln>
                             <a:noFill/>
                           </a:ln>
@@ -36632,7 +36632,7 @@
                         <a:t>string</a:t>
                       </a:r>
                       <a:r>
-                        <a:rPr kumimoji="0" lang="pt-BR" altLang="pt-BR" sz="1200" b="0" i="0" u="none" strike="noStrike" cap="none" normalizeH="0" baseline="0">
+                        <a:rPr kumimoji="0" lang="pt-BR" altLang="pt-BR" sz="1200" b="0" i="0" u="none" strike="noStrike" cap="none" normalizeH="0" baseline="0" dirty="0">
                           <a:ln>
                             <a:noFill/>
                           </a:ln>
@@ -36645,7 +36645,7 @@
                         <a:t> com todas as letras </a:t>
                       </a:r>
                       <a:r>
-                        <a:rPr kumimoji="0" lang="pt-BR" altLang="pt-BR" sz="1200" b="1" i="0" u="none" strike="noStrike" cap="none" normalizeH="0" baseline="0">
+                        <a:rPr kumimoji="0" lang="pt-BR" altLang="pt-BR" sz="1200" b="1" i="0" u="none" strike="noStrike" cap="none" normalizeH="0" baseline="0" dirty="0">
                           <a:ln>
                             <a:noFill/>
                           </a:ln>
@@ -36861,7 +36861,7 @@
                         <a:defRPr/>
                       </a:pPr>
                       <a:r>
-                        <a:rPr kumimoji="0" lang="pt-BR" altLang="pt-BR" sz="1200" b="0" i="0" u="none" strike="noStrike" cap="none" normalizeH="0" baseline="0">
+                        <a:rPr kumimoji="0" lang="pt-BR" altLang="pt-BR" sz="1200" b="0" i="0" u="none" strike="noStrike" cap="none" normalizeH="0" baseline="0" dirty="0">
                           <a:ln>
                             <a:noFill/>
                           </a:ln>
@@ -36874,7 +36874,7 @@
                         <a:t>Retorna um </a:t>
                       </a:r>
                       <a:r>
-                        <a:rPr kumimoji="0" lang="pt-BR" altLang="pt-BR" sz="1200" b="0" i="0" u="none" strike="noStrike" cap="none" normalizeH="0" baseline="0" err="1">
+                        <a:rPr kumimoji="0" lang="pt-BR" altLang="pt-BR" sz="1200" b="0" i="0" u="none" strike="noStrike" cap="none" normalizeH="0" baseline="0" dirty="0" err="1">
                           <a:ln>
                             <a:noFill/>
                           </a:ln>
@@ -36887,7 +36887,7 @@
                         <a:t>string</a:t>
                       </a:r>
                       <a:r>
-                        <a:rPr kumimoji="0" lang="pt-BR" altLang="pt-BR" sz="1200" b="0" i="0" u="none" strike="noStrike" cap="none" normalizeH="0" baseline="0">
+                        <a:rPr kumimoji="0" lang="pt-BR" altLang="pt-BR" sz="1200" b="0" i="0" u="none" strike="noStrike" cap="none" normalizeH="0" baseline="0" dirty="0">
                           <a:ln>
                             <a:noFill/>
                           </a:ln>
@@ -36900,7 +36900,7 @@
                         <a:t> com todas as letras </a:t>
                       </a:r>
                       <a:r>
-                        <a:rPr kumimoji="0" lang="pt-BR" altLang="pt-BR" sz="1200" b="1" i="0" u="none" strike="noStrike" cap="none" normalizeH="0" baseline="0">
+                        <a:rPr kumimoji="0" lang="pt-BR" altLang="pt-BR" sz="1200" b="1" i="0" u="none" strike="noStrike" cap="none" normalizeH="0" baseline="0" dirty="0">
                           <a:ln>
                             <a:noFill/>
                           </a:ln>
@@ -37366,7 +37366,7 @@
                     <a:p>
                       <a:pPr marL="0" algn="l" defTabSz="914400" rtl="0" eaLnBrk="1" latinLnBrk="0" hangingPunct="1"/>
                       <a:r>
-                        <a:rPr lang="pt-BR" sz="1400" b="1" kern="1200" err="1">
+                        <a:rPr lang="pt-BR" sz="1400" b="1" kern="1200" dirty="0" err="1">
                           <a:solidFill>
                             <a:schemeClr val="tx1"/>
                           </a:solidFill>
@@ -37376,7 +37376,7 @@
                         <a:t>s.find</a:t>
                       </a:r>
                       <a:r>
-                        <a:rPr lang="pt-BR" sz="1400" b="1" kern="1200">
+                        <a:rPr lang="pt-BR" sz="1400" b="1" kern="1200" dirty="0">
                           <a:solidFill>
                             <a:schemeClr val="tx1"/>
                           </a:solidFill>
@@ -37388,7 +37388,7 @@
                     </a:p>
                     <a:p>
                       <a:pPr marL="0" algn="l" defTabSz="914400" rtl="0" eaLnBrk="1" latinLnBrk="0" hangingPunct="1"/>
-                      <a:endParaRPr lang="pt-BR" sz="1400" b="1" kern="1200">
+                      <a:endParaRPr lang="pt-BR" sz="1400" b="1" kern="1200" dirty="0">
                         <a:solidFill>
                           <a:schemeClr val="tx1"/>
                         </a:solidFill>
@@ -37426,7 +37426,7 @@
                         <a:defRPr/>
                       </a:pPr>
                       <a:r>
-                        <a:rPr lang="pt-BR" altLang="pt-BR" sz="1200" kern="1200">
+                        <a:rPr lang="pt-BR" altLang="pt-BR" sz="1200" kern="1200" dirty="0">
                           <a:solidFill>
                             <a:schemeClr val="tx1"/>
                           </a:solidFill>
@@ -37436,7 +37436,7 @@
                         <a:t>Pesquisa um </a:t>
                       </a:r>
                       <a:r>
-                        <a:rPr lang="pt-BR" altLang="pt-BR" sz="1200" kern="1200" err="1">
+                        <a:rPr lang="pt-BR" altLang="pt-BR" sz="1200" kern="1200" dirty="0" err="1">
                           <a:solidFill>
                             <a:schemeClr val="tx1"/>
                           </a:solidFill>
@@ -37446,7 +37446,7 @@
                         <a:t>substring</a:t>
                       </a:r>
                       <a:r>
-                        <a:rPr lang="pt-BR" altLang="pt-BR" sz="1200" kern="1200">
+                        <a:rPr lang="pt-BR" altLang="pt-BR" sz="1200" kern="1200" dirty="0">
                           <a:solidFill>
                             <a:schemeClr val="tx1"/>
                           </a:solidFill>
@@ -37785,7 +37785,7 @@
                         <a:defRPr/>
                       </a:pPr>
                       <a:r>
-                        <a:rPr lang="pt-BR" altLang="pt-BR" sz="1200">
+                        <a:rPr lang="pt-BR" altLang="pt-BR" sz="1200" dirty="0">
                           <a:solidFill>
                             <a:schemeClr val="tx1"/>
                           </a:solidFill>
@@ -37952,7 +37952,7 @@
                         <a:defRPr/>
                       </a:pPr>
                       <a:r>
-                        <a:rPr kumimoji="0" lang="pt-BR" altLang="pt-BR" sz="1400" b="0" i="0" u="none" strike="noStrike" kern="1200" cap="none" normalizeH="0" baseline="0">
+                        <a:rPr kumimoji="0" lang="pt-BR" altLang="pt-BR" sz="1400" b="0" i="0" u="none" strike="noStrike" kern="1200" cap="none" normalizeH="0" baseline="0" dirty="0">
                           <a:ln>
                             <a:noFill/>
                           </a:ln>
@@ -37966,7 +37966,7 @@
                         <a:t>abc</a:t>
                       </a:r>
                       <a:r>
-                        <a:rPr kumimoji="0" lang="pt-BR" altLang="pt-BR" sz="1400" b="1" i="0" u="none" strike="noStrike" kern="1200" cap="none" normalizeH="0" baseline="0">
+                        <a:rPr kumimoji="0" lang="pt-BR" altLang="pt-BR" sz="1400" b="1" i="0" u="none" strike="noStrike" kern="1200" cap="none" normalizeH="0" baseline="0" dirty="0">
                           <a:ln>
                             <a:noFill/>
                           </a:ln>
@@ -37980,7 +37980,7 @@
                         <a:t>*</a:t>
                       </a:r>
                       <a:r>
-                        <a:rPr kumimoji="0" lang="pt-BR" altLang="pt-BR" sz="1400" b="0" i="0" u="none" strike="noStrike" kern="1200" cap="none" normalizeH="0" baseline="0">
+                        <a:rPr kumimoji="0" lang="pt-BR" altLang="pt-BR" sz="1400" b="0" i="0" u="none" strike="noStrike" kern="1200" cap="none" normalizeH="0" baseline="0" dirty="0">
                           <a:ln>
                             <a:noFill/>
                           </a:ln>
@@ -37994,7 +37994,7 @@
                         <a:t>123</a:t>
                       </a:r>
                       <a:r>
-                        <a:rPr kumimoji="0" lang="pt-BR" altLang="pt-BR" sz="1400" b="1" i="0" u="none" strike="noStrike" kern="1200" cap="none" normalizeH="0" baseline="0">
+                        <a:rPr kumimoji="0" lang="pt-BR" altLang="pt-BR" sz="1400" b="1" i="0" u="none" strike="noStrike" kern="1200" cap="none" normalizeH="0" baseline="0" dirty="0">
                           <a:ln>
                             <a:noFill/>
                           </a:ln>
@@ -38008,7 +38008,7 @@
                         <a:t>*</a:t>
                       </a:r>
                       <a:r>
-                        <a:rPr kumimoji="0" lang="pt-BR" altLang="pt-BR" sz="1400" b="0" i="0" u="none" strike="noStrike" kern="1200" cap="none" normalizeH="0" baseline="0">
+                        <a:rPr kumimoji="0" lang="pt-BR" altLang="pt-BR" sz="1400" b="0" i="0" u="none" strike="noStrike" kern="1200" cap="none" normalizeH="0" baseline="0" dirty="0">
                           <a:ln>
                             <a:noFill/>
                           </a:ln>
@@ -39489,7 +39489,7 @@
                         <a:defRPr/>
                       </a:pPr>
                       <a:r>
-                        <a:rPr lang="pt-BR" altLang="pt-BR" sz="1400">
+                        <a:rPr lang="pt-BR" altLang="pt-BR" sz="1400" dirty="0">
                           <a:solidFill>
                             <a:schemeClr val="tx1"/>
                           </a:solidFill>
@@ -39498,7 +39498,7 @@
                         <a:t>Retorna</a:t>
                       </a:r>
                       <a:r>
-                        <a:rPr lang="pt-BR" altLang="pt-BR" sz="1400">
+                        <a:rPr lang="pt-BR" altLang="pt-BR" sz="1400" dirty="0">
                           <a:solidFill>
                             <a:schemeClr val="accent6">
                               <a:lumMod val="75000"/>
@@ -39509,7 +39509,7 @@
                         <a:t> </a:t>
                       </a:r>
                       <a:r>
-                        <a:rPr lang="pt-BR" altLang="pt-BR" sz="1400" b="0" err="1">
+                        <a:rPr lang="pt-BR" altLang="pt-BR" sz="1400" b="0" dirty="0" err="1">
                           <a:solidFill>
                             <a:srgbClr val="FF0000"/>
                           </a:solidFill>
@@ -39518,7 +39518,7 @@
                         <a:t>True</a:t>
                       </a:r>
                       <a:r>
-                        <a:rPr lang="pt-BR" altLang="pt-BR" sz="1400">
+                        <a:rPr lang="pt-BR" altLang="pt-BR" sz="1400" dirty="0">
                           <a:solidFill>
                             <a:schemeClr val="accent6">
                               <a:lumMod val="75000"/>
@@ -39529,7 +39529,7 @@
                         <a:t> </a:t>
                       </a:r>
                       <a:r>
-                        <a:rPr lang="pt-BR" altLang="pt-BR" sz="1400">
+                        <a:rPr lang="pt-BR" altLang="pt-BR" sz="1400" dirty="0">
                           <a:solidFill>
                             <a:schemeClr val="tx1"/>
                           </a:solidFill>
@@ -39538,7 +39538,7 @@
                         <a:t>caso a </a:t>
                       </a:r>
                       <a:r>
-                        <a:rPr lang="pt-BR" altLang="pt-BR" sz="1400" err="1">
+                        <a:rPr lang="pt-BR" altLang="pt-BR" sz="1400" dirty="0" err="1">
                           <a:solidFill>
                             <a:schemeClr val="tx1"/>
                           </a:solidFill>
@@ -39547,7 +39547,7 @@
                         <a:t>string</a:t>
                       </a:r>
                       <a:r>
-                        <a:rPr lang="pt-BR" altLang="pt-BR" sz="1400">
+                        <a:rPr lang="pt-BR" altLang="pt-BR" sz="1400" dirty="0">
                           <a:solidFill>
                             <a:schemeClr val="tx1"/>
                           </a:solidFill>
@@ -39556,7 +39556,7 @@
                         <a:t> contenha </a:t>
                       </a:r>
                       <a:r>
-                        <a:rPr lang="pt-BR" altLang="pt-BR" sz="1400">
+                        <a:rPr lang="pt-BR" altLang="pt-BR" sz="1400" dirty="0">
                           <a:solidFill>
                             <a:srgbClr val="FF0000"/>
                           </a:solidFill>
@@ -39565,7 +39565,7 @@
                         <a:t>apenas letras</a:t>
                       </a:r>
                       <a:r>
-                        <a:rPr lang="pt-BR" altLang="pt-BR" sz="1400">
+                        <a:rPr lang="pt-BR" altLang="pt-BR" sz="1400" dirty="0">
                           <a:solidFill>
                             <a:schemeClr val="tx1"/>
                           </a:solidFill>
@@ -39574,7 +39574,7 @@
                         <a:t>, se não  </a:t>
                       </a:r>
                       <a:r>
-                        <a:rPr lang="pt-BR" altLang="pt-BR" sz="1400" b="0">
+                        <a:rPr lang="pt-BR" altLang="pt-BR" sz="1400" b="0" dirty="0">
                           <a:solidFill>
                             <a:srgbClr val="FF0000"/>
                           </a:solidFill>
@@ -39583,7 +39583,7 @@
                         <a:t>False</a:t>
                       </a:r>
                       <a:r>
-                        <a:rPr lang="pt-BR" altLang="pt-BR" sz="1400">
+                        <a:rPr lang="pt-BR" altLang="pt-BR" sz="1400" dirty="0">
                           <a:solidFill>
                             <a:schemeClr val="tx1"/>
                           </a:solidFill>
@@ -40056,7 +40056,7 @@
                         <a:defRPr/>
                       </a:pPr>
                       <a:r>
-                        <a:rPr lang="pt-BR" altLang="pt-BR" sz="1400">
+                        <a:rPr lang="pt-BR" altLang="pt-BR" sz="1400" dirty="0">
                           <a:solidFill>
                             <a:schemeClr val="tx1"/>
                           </a:solidFill>
@@ -40065,7 +40065,7 @@
                         <a:t>Retorna uma lista de </a:t>
                       </a:r>
                       <a:r>
-                        <a:rPr lang="pt-BR" altLang="pt-BR" sz="1400" err="1">
+                        <a:rPr lang="pt-BR" altLang="pt-BR" sz="1400" dirty="0" err="1">
                           <a:solidFill>
                             <a:schemeClr val="tx1"/>
                           </a:solidFill>
@@ -40074,7 +40074,7 @@
                         <a:t>strings</a:t>
                       </a:r>
                       <a:r>
-                        <a:rPr lang="pt-BR" altLang="pt-BR" sz="1400">
+                        <a:rPr lang="pt-BR" altLang="pt-BR" sz="1400" dirty="0">
                           <a:solidFill>
                             <a:schemeClr val="tx1"/>
                           </a:solidFill>

</xml_diff>